<commit_message>
edited fat and ntfs background figs
</commit_message>
<xml_diff>
--- a/dfr_metadata/paper/fig/fat1.pptx
+++ b/dfr_metadata/paper/fig/fat1.pptx
@@ -259,7 +259,7 @@
           <a:p>
             <a:fld id="{CFC90A4D-0449-FE4F-8963-89C122A9FB4A}" type="datetimeFigureOut">
               <a:rPr lang="en-US" smtClean="0"/>
-              <a:t>10/25/19</a:t>
+              <a:t>10/26/19</a:t>
             </a:fld>
             <a:endParaRPr lang="en-US"/>
           </a:p>
@@ -457,7 +457,7 @@
           <a:p>
             <a:fld id="{CFC90A4D-0449-FE4F-8963-89C122A9FB4A}" type="datetimeFigureOut">
               <a:rPr lang="en-US" smtClean="0"/>
-              <a:t>10/25/19</a:t>
+              <a:t>10/26/19</a:t>
             </a:fld>
             <a:endParaRPr lang="en-US"/>
           </a:p>
@@ -665,7 +665,7 @@
           <a:p>
             <a:fld id="{CFC90A4D-0449-FE4F-8963-89C122A9FB4A}" type="datetimeFigureOut">
               <a:rPr lang="en-US" smtClean="0"/>
-              <a:t>10/25/19</a:t>
+              <a:t>10/26/19</a:t>
             </a:fld>
             <a:endParaRPr lang="en-US"/>
           </a:p>
@@ -863,7 +863,7 @@
           <a:p>
             <a:fld id="{CFC90A4D-0449-FE4F-8963-89C122A9FB4A}" type="datetimeFigureOut">
               <a:rPr lang="en-US" smtClean="0"/>
-              <a:t>10/25/19</a:t>
+              <a:t>10/26/19</a:t>
             </a:fld>
             <a:endParaRPr lang="en-US"/>
           </a:p>
@@ -1138,7 +1138,7 @@
           <a:p>
             <a:fld id="{CFC90A4D-0449-FE4F-8963-89C122A9FB4A}" type="datetimeFigureOut">
               <a:rPr lang="en-US" smtClean="0"/>
-              <a:t>10/25/19</a:t>
+              <a:t>10/26/19</a:t>
             </a:fld>
             <a:endParaRPr lang="en-US"/>
           </a:p>
@@ -1403,7 +1403,7 @@
           <a:p>
             <a:fld id="{CFC90A4D-0449-FE4F-8963-89C122A9FB4A}" type="datetimeFigureOut">
               <a:rPr lang="en-US" smtClean="0"/>
-              <a:t>10/25/19</a:t>
+              <a:t>10/26/19</a:t>
             </a:fld>
             <a:endParaRPr lang="en-US"/>
           </a:p>
@@ -1815,7 +1815,7 @@
           <a:p>
             <a:fld id="{CFC90A4D-0449-FE4F-8963-89C122A9FB4A}" type="datetimeFigureOut">
               <a:rPr lang="en-US" smtClean="0"/>
-              <a:t>10/25/19</a:t>
+              <a:t>10/26/19</a:t>
             </a:fld>
             <a:endParaRPr lang="en-US"/>
           </a:p>
@@ -1956,7 +1956,7 @@
           <a:p>
             <a:fld id="{CFC90A4D-0449-FE4F-8963-89C122A9FB4A}" type="datetimeFigureOut">
               <a:rPr lang="en-US" smtClean="0"/>
-              <a:t>10/25/19</a:t>
+              <a:t>10/26/19</a:t>
             </a:fld>
             <a:endParaRPr lang="en-US"/>
           </a:p>
@@ -2069,7 +2069,7 @@
           <a:p>
             <a:fld id="{CFC90A4D-0449-FE4F-8963-89C122A9FB4A}" type="datetimeFigureOut">
               <a:rPr lang="en-US" smtClean="0"/>
-              <a:t>10/25/19</a:t>
+              <a:t>10/26/19</a:t>
             </a:fld>
             <a:endParaRPr lang="en-US"/>
           </a:p>
@@ -2380,7 +2380,7 @@
           <a:p>
             <a:fld id="{CFC90A4D-0449-FE4F-8963-89C122A9FB4A}" type="datetimeFigureOut">
               <a:rPr lang="en-US" smtClean="0"/>
-              <a:t>10/25/19</a:t>
+              <a:t>10/26/19</a:t>
             </a:fld>
             <a:endParaRPr lang="en-US"/>
           </a:p>
@@ -2668,7 +2668,7 @@
           <a:p>
             <a:fld id="{CFC90A4D-0449-FE4F-8963-89C122A9FB4A}" type="datetimeFigureOut">
               <a:rPr lang="en-US" smtClean="0"/>
-              <a:t>10/25/19</a:t>
+              <a:t>10/26/19</a:t>
             </a:fld>
             <a:endParaRPr lang="en-US"/>
           </a:p>
@@ -2909,7 +2909,7 @@
           <a:p>
             <a:fld id="{CFC90A4D-0449-FE4F-8963-89C122A9FB4A}" type="datetimeFigureOut">
               <a:rPr lang="en-US" smtClean="0"/>
-              <a:t>10/25/19</a:t>
+              <a:t>10/26/19</a:t>
             </a:fld>
             <a:endParaRPr lang="en-US"/>
           </a:p>
@@ -3341,9 +3341,9 @@
         <p:grpSpPr>
           <a:xfrm>
             <a:off x="213420" y="310242"/>
-            <a:ext cx="11771752" cy="6319157"/>
+            <a:ext cx="11771752" cy="5922262"/>
             <a:chOff x="620486" y="714894"/>
-            <a:chExt cx="8416511" cy="4410255"/>
+            <a:chExt cx="8416511" cy="4133255"/>
           </a:xfrm>
         </p:grpSpPr>
         <p:sp>
@@ -3742,8 +3742,8 @@
           </p:nvSpPr>
           <p:spPr>
             <a:xfrm rot="5400000">
-              <a:off x="7404920" y="1522017"/>
-              <a:ext cx="415498" cy="369332"/>
+              <a:off x="7288598" y="1533643"/>
+              <a:ext cx="415498" cy="264063"/>
             </a:xfrm>
             <a:prstGeom prst="rect">
               <a:avLst/>
@@ -3751,7 +3751,7 @@
             <a:noFill/>
           </p:spPr>
           <p:txBody>
-            <a:bodyPr wrap="none" rtlCol="0">
+            <a:bodyPr wrap="square" rtlCol="0">
               <a:spAutoFit/>
             </a:bodyPr>
             <a:lstStyle/>
@@ -3777,7 +3777,7 @@
           </p:nvSpPr>
           <p:spPr>
             <a:xfrm rot="5400000">
-              <a:off x="7404920" y="2605708"/>
+              <a:off x="7241556" y="2617190"/>
               <a:ext cx="415498" cy="369332"/>
             </a:xfrm>
             <a:prstGeom prst="rect">
@@ -3812,7 +3812,7 @@
           </p:nvSpPr>
           <p:spPr>
             <a:xfrm rot="5400000">
-              <a:off x="7404920" y="3664460"/>
+              <a:off x="7273780" y="3755250"/>
               <a:ext cx="415498" cy="369332"/>
             </a:xfrm>
             <a:prstGeom prst="rect">
@@ -4005,8 +4005,8 @@
           </p:nvSpPr>
           <p:spPr>
             <a:xfrm>
-              <a:off x="2409312" y="1673327"/>
-              <a:ext cx="535724" cy="369332"/>
+              <a:off x="2270624" y="1606848"/>
+              <a:ext cx="915785" cy="451086"/>
             </a:xfrm>
             <a:prstGeom prst="rect">
               <a:avLst/>
@@ -4021,7 +4021,13 @@
             <a:p>
               <a:r>
                 <a:rPr lang="en-US" dirty="0"/>
-                <a:t>100</a:t>
+                <a:t>Starting</a:t>
+              </a:r>
+            </a:p>
+            <a:p>
+              <a:r>
+                <a:rPr lang="en-US" dirty="0"/>
+                <a:t>cluster=100</a:t>
               </a:r>
             </a:p>
           </p:txBody>
@@ -4082,7 +4088,7 @@
           <p:spPr>
             <a:xfrm>
               <a:off x="667484" y="1637433"/>
-              <a:ext cx="800732" cy="369332"/>
+              <a:ext cx="715767" cy="257764"/>
             </a:xfrm>
             <a:prstGeom prst="rect">
               <a:avLst/>
@@ -4096,10 +4102,17 @@
             <a:lstStyle/>
             <a:p>
               <a:r>
+                <a:rPr lang="en-US" dirty="0"/>
+                <a:t>“</a:t>
+              </a:r>
+              <a:r>
                 <a:rPr lang="en-US" dirty="0" err="1"/>
                 <a:t>foo.txt</a:t>
               </a:r>
-              <a:endParaRPr lang="en-US" dirty="0"/>
+              <a:r>
+                <a:rPr lang="en-US" dirty="0"/>
+                <a:t>”</a:t>
+              </a:r>
             </a:p>
           </p:txBody>
         </p:sp>
@@ -4118,7 +4131,7 @@
           <p:spPr>
             <a:xfrm>
               <a:off x="7162598" y="4478818"/>
-              <a:ext cx="659540" cy="646331"/>
+              <a:ext cx="738231" cy="257764"/>
             </a:xfrm>
             <a:prstGeom prst="rect">
               <a:avLst/>
@@ -4133,13 +4146,7 @@
             <a:p>
               <a:r>
                 <a:rPr lang="en-US" dirty="0"/>
-                <a:t>FAT</a:t>
-              </a:r>
-            </a:p>
-            <a:p>
-              <a:r>
-                <a:rPr lang="en-US" dirty="0"/>
-                <a:t>table</a:t>
+                <a:t>FAT table</a:t>
               </a:r>
             </a:p>
           </p:txBody>
@@ -4506,7 +4513,7 @@
           <p:spPr>
             <a:xfrm>
               <a:off x="667484" y="2266833"/>
-              <a:ext cx="2814681" cy="369332"/>
+              <a:ext cx="2009080" cy="257764"/>
             </a:xfrm>
             <a:prstGeom prst="rect">
               <a:avLst/>
@@ -4528,10 +4535,18 @@
                 <a:t> of file </a:t>
               </a:r>
               <a:r>
-                <a:rPr lang="en-US" dirty="0" err="1"/>
+                <a:rPr lang="en-US" i="1" dirty="0" err="1">
+                  <a:solidFill>
+                    <a:srgbClr val="0070C0"/>
+                  </a:solidFill>
+                </a:rPr>
                 <a:t>foo.txt</a:t>
               </a:r>
-              <a:endParaRPr lang="en-US" dirty="0"/>
+              <a:endParaRPr lang="en-US" i="1" dirty="0">
+                <a:solidFill>
+                  <a:srgbClr val="0070C0"/>
+                </a:solidFill>
+              </a:endParaRPr>
             </a:p>
           </p:txBody>
         </p:sp>

</xml_diff>